<commit_message>
Updated ppt in Planing folder
</commit_message>
<xml_diff>
--- a/Planning/Virtual Velocity V1.2.pptx
+++ b/Planning/Virtual Velocity V1.2.pptx
@@ -190,7 +190,7 @@
           <a:noFill/>
           <a:extLst>
             <a:ext uri="{909E8E84-426E-40dd-AFC4-6F175D3DCCD1}">
-              <a14:hiddenFill xmlns="" xmlns:a14="http://schemas.microsoft.com/office/drawing/2010/main">
+              <a14:hiddenFill xmlns:a14="http://schemas.microsoft.com/office/drawing/2010/main" xmlns="">
                 <a:solidFill>
                   <a:srgbClr val="FFFFFF"/>
                 </a:solidFill>
@@ -249,7 +249,7 @@
             </a:ln>
             <a:extLst>
               <a:ext uri="{91240B29-F687-4f45-9708-019B960494DF}">
-                <a14:hiddenLine xmlns="" xmlns:a14="http://schemas.microsoft.com/office/drawing/2010/main" w="9525">
+                <a14:hiddenLine xmlns:a14="http://schemas.microsoft.com/office/drawing/2010/main" xmlns="" w="9525">
                   <a:solidFill>
                     <a:srgbClr val="000000"/>
                   </a:solidFill>
@@ -339,7 +339,7 @@
             </a:ln>
             <a:extLst>
               <a:ext uri="{91240B29-F687-4f45-9708-019B960494DF}">
-                <a14:hiddenLine xmlns="" xmlns:a14="http://schemas.microsoft.com/office/drawing/2010/main" w="9525">
+                <a14:hiddenLine xmlns:a14="http://schemas.microsoft.com/office/drawing/2010/main" xmlns="" w="9525">
                   <a:solidFill>
                     <a:srgbClr val="000000"/>
                   </a:solidFill>
@@ -429,7 +429,7 @@
             </a:ln>
             <a:extLst>
               <a:ext uri="{91240B29-F687-4f45-9708-019B960494DF}">
-                <a14:hiddenLine xmlns="" xmlns:a14="http://schemas.microsoft.com/office/drawing/2010/main" w="9525">
+                <a14:hiddenLine xmlns:a14="http://schemas.microsoft.com/office/drawing/2010/main" xmlns="" w="9525">
                   <a:solidFill>
                     <a:srgbClr val="000000"/>
                   </a:solidFill>
@@ -463,7 +463,7 @@
             </a:ln>
             <a:extLst>
               <a:ext uri="{91240B29-F687-4f45-9708-019B960494DF}">
-                <a14:hiddenLine xmlns="" xmlns:a14="http://schemas.microsoft.com/office/drawing/2010/main" w="9525">
+                <a14:hiddenLine xmlns:a14="http://schemas.microsoft.com/office/drawing/2010/main" xmlns="" w="9525">
                   <a:solidFill>
                     <a:srgbClr val="000000"/>
                   </a:solidFill>
@@ -553,7 +553,7 @@
             </a:ln>
             <a:extLst>
               <a:ext uri="{91240B29-F687-4f45-9708-019B960494DF}">
-                <a14:hiddenLine xmlns="" xmlns:a14="http://schemas.microsoft.com/office/drawing/2010/main" w="9525">
+                <a14:hiddenLine xmlns:a14="http://schemas.microsoft.com/office/drawing/2010/main" xmlns="" w="9525">
                   <a:solidFill>
                     <a:srgbClr val="000000"/>
                   </a:solidFill>
@@ -615,7 +615,7 @@
             </a:ln>
             <a:extLst>
               <a:ext uri="{91240B29-F687-4f45-9708-019B960494DF}">
-                <a14:hiddenLine xmlns="" xmlns:a14="http://schemas.microsoft.com/office/drawing/2010/main" w="9525">
+                <a14:hiddenLine xmlns:a14="http://schemas.microsoft.com/office/drawing/2010/main" xmlns="" w="9525">
                   <a:solidFill>
                     <a:srgbClr val="000000"/>
                   </a:solidFill>
@@ -677,7 +677,7 @@
             </a:ln>
             <a:extLst>
               <a:ext uri="{91240B29-F687-4f45-9708-019B960494DF}">
-                <a14:hiddenLine xmlns="" xmlns:a14="http://schemas.microsoft.com/office/drawing/2010/main" w="9525">
+                <a14:hiddenLine xmlns:a14="http://schemas.microsoft.com/office/drawing/2010/main" xmlns="" w="9525">
                   <a:solidFill>
                     <a:srgbClr val="000000"/>
                   </a:solidFill>
@@ -767,7 +767,7 @@
             </a:ln>
             <a:extLst>
               <a:ext uri="{91240B29-F687-4f45-9708-019B960494DF}">
-                <a14:hiddenLine xmlns="" xmlns:a14="http://schemas.microsoft.com/office/drawing/2010/main" w="9525">
+                <a14:hiddenLine xmlns:a14="http://schemas.microsoft.com/office/drawing/2010/main" xmlns="" w="9525">
                   <a:solidFill>
                     <a:srgbClr val="000000"/>
                   </a:solidFill>
@@ -829,7 +829,7 @@
             </a:ln>
             <a:extLst>
               <a:ext uri="{91240B29-F687-4f45-9708-019B960494DF}">
-                <a14:hiddenLine xmlns="" xmlns:a14="http://schemas.microsoft.com/office/drawing/2010/main" w="9525">
+                <a14:hiddenLine xmlns:a14="http://schemas.microsoft.com/office/drawing/2010/main" xmlns="" w="9525">
                   <a:solidFill>
                     <a:srgbClr val="000000"/>
                   </a:solidFill>
@@ -891,7 +891,7 @@
             </a:ln>
             <a:extLst>
               <a:ext uri="{91240B29-F687-4f45-9708-019B960494DF}">
-                <a14:hiddenLine xmlns="" xmlns:a14="http://schemas.microsoft.com/office/drawing/2010/main" w="9525">
+                <a14:hiddenLine xmlns:a14="http://schemas.microsoft.com/office/drawing/2010/main" xmlns="" w="9525">
                   <a:solidFill>
                     <a:srgbClr val="000000"/>
                   </a:solidFill>
@@ -981,7 +981,7 @@
             </a:ln>
             <a:extLst>
               <a:ext uri="{91240B29-F687-4f45-9708-019B960494DF}">
-                <a14:hiddenLine xmlns="" xmlns:a14="http://schemas.microsoft.com/office/drawing/2010/main" w="9525">
+                <a14:hiddenLine xmlns:a14="http://schemas.microsoft.com/office/drawing/2010/main" xmlns="" w="9525">
                   <a:solidFill>
                     <a:srgbClr val="000000"/>
                   </a:solidFill>
@@ -1071,7 +1071,7 @@
             </a:ln>
             <a:extLst>
               <a:ext uri="{91240B29-F687-4f45-9708-019B960494DF}">
-                <a14:hiddenLine xmlns="" xmlns:a14="http://schemas.microsoft.com/office/drawing/2010/main" w="9525">
+                <a14:hiddenLine xmlns:a14="http://schemas.microsoft.com/office/drawing/2010/main" xmlns="" w="9525">
                   <a:solidFill>
                     <a:srgbClr val="000000"/>
                   </a:solidFill>
@@ -1133,7 +1133,7 @@
             </a:ln>
             <a:extLst>
               <a:ext uri="{91240B29-F687-4f45-9708-019B960494DF}">
-                <a14:hiddenLine xmlns="" xmlns:a14="http://schemas.microsoft.com/office/drawing/2010/main" w="9525">
+                <a14:hiddenLine xmlns:a14="http://schemas.microsoft.com/office/drawing/2010/main" xmlns="" w="9525">
                   <a:solidFill>
                     <a:srgbClr val="000000"/>
                   </a:solidFill>
@@ -1243,7 +1243,7 @@
             </a:ln>
             <a:extLst>
               <a:ext uri="{91240B29-F687-4f45-9708-019B960494DF}">
-                <a14:hiddenLine xmlns="" xmlns:a14="http://schemas.microsoft.com/office/drawing/2010/main" w="9525">
+                <a14:hiddenLine xmlns:a14="http://schemas.microsoft.com/office/drawing/2010/main" xmlns="" w="9525">
                   <a:solidFill>
                     <a:srgbClr val="000000"/>
                   </a:solidFill>
@@ -1305,7 +1305,7 @@
             </a:ln>
             <a:extLst>
               <a:ext uri="{91240B29-F687-4f45-9708-019B960494DF}">
-                <a14:hiddenLine xmlns="" xmlns:a14="http://schemas.microsoft.com/office/drawing/2010/main" w="9525">
+                <a14:hiddenLine xmlns:a14="http://schemas.microsoft.com/office/drawing/2010/main" xmlns="" w="9525">
                   <a:solidFill>
                     <a:srgbClr val="000000"/>
                   </a:solidFill>
@@ -1395,7 +1395,7 @@
             </a:ln>
             <a:extLst>
               <a:ext uri="{91240B29-F687-4f45-9708-019B960494DF}">
-                <a14:hiddenLine xmlns="" xmlns:a14="http://schemas.microsoft.com/office/drawing/2010/main" w="9525">
+                <a14:hiddenLine xmlns:a14="http://schemas.microsoft.com/office/drawing/2010/main" xmlns="" w="9525">
                   <a:solidFill>
                     <a:srgbClr val="000000"/>
                   </a:solidFill>
@@ -1485,7 +1485,7 @@
             </a:ln>
             <a:extLst>
               <a:ext uri="{91240B29-F687-4f45-9708-019B960494DF}">
-                <a14:hiddenLine xmlns="" xmlns:a14="http://schemas.microsoft.com/office/drawing/2010/main" w="9525">
+                <a14:hiddenLine xmlns:a14="http://schemas.microsoft.com/office/drawing/2010/main" xmlns="" w="9525">
                   <a:solidFill>
                     <a:srgbClr val="000000"/>
                   </a:solidFill>
@@ -1547,7 +1547,7 @@
             </a:ln>
             <a:extLst>
               <a:ext uri="{91240B29-F687-4f45-9708-019B960494DF}">
-                <a14:hiddenLine xmlns="" xmlns:a14="http://schemas.microsoft.com/office/drawing/2010/main" w="9525">
+                <a14:hiddenLine xmlns:a14="http://schemas.microsoft.com/office/drawing/2010/main" xmlns="" w="9525">
                   <a:solidFill>
                     <a:srgbClr val="000000"/>
                   </a:solidFill>
@@ -1637,7 +1637,7 @@
             </a:ln>
             <a:extLst>
               <a:ext uri="{91240B29-F687-4f45-9708-019B960494DF}">
-                <a14:hiddenLine xmlns="" xmlns:a14="http://schemas.microsoft.com/office/drawing/2010/main" w="9525">
+                <a14:hiddenLine xmlns:a14="http://schemas.microsoft.com/office/drawing/2010/main" xmlns="" w="9525">
                   <a:solidFill>
                     <a:srgbClr val="000000"/>
                   </a:solidFill>
@@ -1727,7 +1727,7 @@
             </a:ln>
             <a:extLst>
               <a:ext uri="{91240B29-F687-4f45-9708-019B960494DF}">
-                <a14:hiddenLine xmlns="" xmlns:a14="http://schemas.microsoft.com/office/drawing/2010/main" w="9525">
+                <a14:hiddenLine xmlns:a14="http://schemas.microsoft.com/office/drawing/2010/main" xmlns="" w="9525">
                   <a:solidFill>
                     <a:srgbClr val="000000"/>
                   </a:solidFill>
@@ -1783,7 +1783,7 @@
             </a:ln>
             <a:extLst>
               <a:ext uri="{91240B29-F687-4f45-9708-019B960494DF}">
-                <a14:hiddenLine xmlns="" xmlns:a14="http://schemas.microsoft.com/office/drawing/2010/main" w="9525">
+                <a14:hiddenLine xmlns:a14="http://schemas.microsoft.com/office/drawing/2010/main" xmlns="" w="9525">
                   <a:solidFill>
                     <a:srgbClr val="000000"/>
                   </a:solidFill>
@@ -1873,7 +1873,7 @@
             </a:ln>
             <a:extLst>
               <a:ext uri="{91240B29-F687-4f45-9708-019B960494DF}">
-                <a14:hiddenLine xmlns="" xmlns:a14="http://schemas.microsoft.com/office/drawing/2010/main" w="9525">
+                <a14:hiddenLine xmlns:a14="http://schemas.microsoft.com/office/drawing/2010/main" xmlns="" w="9525">
                   <a:solidFill>
                     <a:srgbClr val="000000"/>
                   </a:solidFill>
@@ -1929,7 +1929,7 @@
             </a:ln>
             <a:extLst>
               <a:ext uri="{91240B29-F687-4f45-9708-019B960494DF}">
-                <a14:hiddenLine xmlns="" xmlns:a14="http://schemas.microsoft.com/office/drawing/2010/main" w="9525">
+                <a14:hiddenLine xmlns:a14="http://schemas.microsoft.com/office/drawing/2010/main" xmlns="" w="9525">
                   <a:solidFill>
                     <a:srgbClr val="000000"/>
                   </a:solidFill>
@@ -2019,7 +2019,7 @@
             </a:ln>
             <a:extLst>
               <a:ext uri="{91240B29-F687-4f45-9708-019B960494DF}">
-                <a14:hiddenLine xmlns="" xmlns:a14="http://schemas.microsoft.com/office/drawing/2010/main" w="9525">
+                <a14:hiddenLine xmlns:a14="http://schemas.microsoft.com/office/drawing/2010/main" xmlns="" w="9525">
                   <a:solidFill>
                     <a:srgbClr val="000000"/>
                   </a:solidFill>
@@ -2087,7 +2087,7 @@
             </a:ln>
             <a:extLst>
               <a:ext uri="{91240B29-F687-4f45-9708-019B960494DF}">
-                <a14:hiddenLine xmlns="" xmlns:a14="http://schemas.microsoft.com/office/drawing/2010/main" w="9525">
+                <a14:hiddenLine xmlns:a14="http://schemas.microsoft.com/office/drawing/2010/main" xmlns="" w="9525">
                   <a:solidFill>
                     <a:srgbClr val="000000"/>
                   </a:solidFill>
@@ -2177,7 +2177,7 @@
             </a:ln>
             <a:extLst>
               <a:ext uri="{91240B29-F687-4f45-9708-019B960494DF}">
-                <a14:hiddenLine xmlns="" xmlns:a14="http://schemas.microsoft.com/office/drawing/2010/main" w="9525">
+                <a14:hiddenLine xmlns:a14="http://schemas.microsoft.com/office/drawing/2010/main" xmlns="" w="9525">
                   <a:solidFill>
                     <a:srgbClr val="000000"/>
                   </a:solidFill>
@@ -2245,7 +2245,7 @@
             </a:ln>
             <a:extLst>
               <a:ext uri="{91240B29-F687-4f45-9708-019B960494DF}">
-                <a14:hiddenLine xmlns="" xmlns:a14="http://schemas.microsoft.com/office/drawing/2010/main" w="9525">
+                <a14:hiddenLine xmlns:a14="http://schemas.microsoft.com/office/drawing/2010/main" xmlns="" w="9525">
                   <a:solidFill>
                     <a:srgbClr val="000000"/>
                   </a:solidFill>
@@ -2335,7 +2335,7 @@
             </a:ln>
             <a:extLst>
               <a:ext uri="{91240B29-F687-4f45-9708-019B960494DF}">
-                <a14:hiddenLine xmlns="" xmlns:a14="http://schemas.microsoft.com/office/drawing/2010/main" w="9525">
+                <a14:hiddenLine xmlns:a14="http://schemas.microsoft.com/office/drawing/2010/main" xmlns="" w="9525">
                   <a:solidFill>
                     <a:srgbClr val="000000"/>
                   </a:solidFill>
@@ -2369,7 +2369,7 @@
             </a:ln>
             <a:extLst>
               <a:ext uri="{91240B29-F687-4f45-9708-019B960494DF}">
-                <a14:hiddenLine xmlns="" xmlns:a14="http://schemas.microsoft.com/office/drawing/2010/main" w="9525">
+                <a14:hiddenLine xmlns:a14="http://schemas.microsoft.com/office/drawing/2010/main" xmlns="" w="9525">
                   <a:solidFill>
                     <a:srgbClr val="000000"/>
                   </a:solidFill>
@@ -2459,7 +2459,7 @@
             </a:ln>
             <a:extLst>
               <a:ext uri="{91240B29-F687-4f45-9708-019B960494DF}">
-                <a14:hiddenLine xmlns="" xmlns:a14="http://schemas.microsoft.com/office/drawing/2010/main" w="9525">
+                <a14:hiddenLine xmlns:a14="http://schemas.microsoft.com/office/drawing/2010/main" xmlns="" w="9525">
                   <a:solidFill>
                     <a:srgbClr val="000000"/>
                   </a:solidFill>
@@ -2521,7 +2521,7 @@
             </a:ln>
             <a:extLst>
               <a:ext uri="{91240B29-F687-4f45-9708-019B960494DF}">
-                <a14:hiddenLine xmlns="" xmlns:a14="http://schemas.microsoft.com/office/drawing/2010/main" w="9525">
+                <a14:hiddenLine xmlns:a14="http://schemas.microsoft.com/office/drawing/2010/main" xmlns="" w="9525">
                   <a:solidFill>
                     <a:srgbClr val="000000"/>
                   </a:solidFill>
@@ -2583,7 +2583,7 @@
             </a:ln>
             <a:extLst>
               <a:ext uri="{91240B29-F687-4f45-9708-019B960494DF}">
-                <a14:hiddenLine xmlns="" xmlns:a14="http://schemas.microsoft.com/office/drawing/2010/main" w="9525">
+                <a14:hiddenLine xmlns:a14="http://schemas.microsoft.com/office/drawing/2010/main" xmlns="" w="9525">
                   <a:solidFill>
                     <a:srgbClr val="000000"/>
                   </a:solidFill>
@@ -2673,7 +2673,7 @@
             </a:ln>
             <a:extLst>
               <a:ext uri="{91240B29-F687-4f45-9708-019B960494DF}">
-                <a14:hiddenLine xmlns="" xmlns:a14="http://schemas.microsoft.com/office/drawing/2010/main" w="9525">
+                <a14:hiddenLine xmlns:a14="http://schemas.microsoft.com/office/drawing/2010/main" xmlns="" w="9525">
                   <a:solidFill>
                     <a:srgbClr val="000000"/>
                   </a:solidFill>
@@ -2741,7 +2741,7 @@
             </a:ln>
             <a:extLst>
               <a:ext uri="{91240B29-F687-4f45-9708-019B960494DF}">
-                <a14:hiddenLine xmlns="" xmlns:a14="http://schemas.microsoft.com/office/drawing/2010/main" w="9525">
+                <a14:hiddenLine xmlns:a14="http://schemas.microsoft.com/office/drawing/2010/main" xmlns="" w="9525">
                   <a:solidFill>
                     <a:srgbClr val="000000"/>
                   </a:solidFill>
@@ -2803,7 +2803,7 @@
             </a:ln>
             <a:extLst>
               <a:ext uri="{91240B29-F687-4f45-9708-019B960494DF}">
-                <a14:hiddenLine xmlns="" xmlns:a14="http://schemas.microsoft.com/office/drawing/2010/main" w="9525">
+                <a14:hiddenLine xmlns:a14="http://schemas.microsoft.com/office/drawing/2010/main" xmlns="" w="9525">
                   <a:solidFill>
                     <a:srgbClr val="000000"/>
                   </a:solidFill>
@@ -2893,7 +2893,7 @@
             </a:ln>
             <a:extLst>
               <a:ext uri="{91240B29-F687-4f45-9708-019B960494DF}">
-                <a14:hiddenLine xmlns="" xmlns:a14="http://schemas.microsoft.com/office/drawing/2010/main" w="9525">
+                <a14:hiddenLine xmlns:a14="http://schemas.microsoft.com/office/drawing/2010/main" xmlns="" w="9525">
                   <a:solidFill>
                     <a:srgbClr val="000000"/>
                   </a:solidFill>
@@ -2955,7 +2955,7 @@
             </a:ln>
             <a:extLst>
               <a:ext uri="{91240B29-F687-4f45-9708-019B960494DF}">
-                <a14:hiddenLine xmlns="" xmlns:a14="http://schemas.microsoft.com/office/drawing/2010/main" w="9525">
+                <a14:hiddenLine xmlns:a14="http://schemas.microsoft.com/office/drawing/2010/main" xmlns="" w="9525">
                   <a:solidFill>
                     <a:srgbClr val="000000"/>
                   </a:solidFill>
@@ -3045,7 +3045,7 @@
             </a:ln>
             <a:extLst>
               <a:ext uri="{91240B29-F687-4f45-9708-019B960494DF}">
-                <a14:hiddenLine xmlns="" xmlns:a14="http://schemas.microsoft.com/office/drawing/2010/main" w="9525">
+                <a14:hiddenLine xmlns:a14="http://schemas.microsoft.com/office/drawing/2010/main" xmlns="" w="9525">
                   <a:solidFill>
                     <a:srgbClr val="000000"/>
                   </a:solidFill>
@@ -3107,7 +3107,7 @@
             </a:ln>
             <a:extLst>
               <a:ext uri="{91240B29-F687-4f45-9708-019B960494DF}">
-                <a14:hiddenLine xmlns="" xmlns:a14="http://schemas.microsoft.com/office/drawing/2010/main" w="9525">
+                <a14:hiddenLine xmlns:a14="http://schemas.microsoft.com/office/drawing/2010/main" xmlns="" w="9525">
                   <a:solidFill>
                     <a:srgbClr val="000000"/>
                   </a:solidFill>
@@ -3197,7 +3197,7 @@
             </a:ln>
             <a:extLst>
               <a:ext uri="{91240B29-F687-4f45-9708-019B960494DF}">
-                <a14:hiddenLine xmlns="" xmlns:a14="http://schemas.microsoft.com/office/drawing/2010/main" w="9525">
+                <a14:hiddenLine xmlns:a14="http://schemas.microsoft.com/office/drawing/2010/main" xmlns="" w="9525">
                   <a:solidFill>
                     <a:srgbClr val="000000"/>
                   </a:solidFill>
@@ -3231,7 +3231,7 @@
             </a:ln>
             <a:extLst>
               <a:ext uri="{91240B29-F687-4f45-9708-019B960494DF}">
-                <a14:hiddenLine xmlns="" xmlns:a14="http://schemas.microsoft.com/office/drawing/2010/main" w="9525">
+                <a14:hiddenLine xmlns:a14="http://schemas.microsoft.com/office/drawing/2010/main" xmlns="" w="9525">
                   <a:solidFill>
                     <a:srgbClr val="000000"/>
                   </a:solidFill>
@@ -3296,7 +3296,7 @@
             </a:ln>
             <a:extLst>
               <a:ext uri="{91240B29-F687-4f45-9708-019B960494DF}">
-                <a14:hiddenLine xmlns="" xmlns:a14="http://schemas.microsoft.com/office/drawing/2010/main" w="9525">
+                <a14:hiddenLine xmlns:a14="http://schemas.microsoft.com/office/drawing/2010/main" xmlns="" w="9525">
                   <a:solidFill>
                     <a:srgbClr val="000000"/>
                   </a:solidFill>
@@ -3386,7 +3386,7 @@
             </a:ln>
             <a:extLst>
               <a:ext uri="{91240B29-F687-4f45-9708-019B960494DF}">
-                <a14:hiddenLine xmlns="" xmlns:a14="http://schemas.microsoft.com/office/drawing/2010/main" w="9525">
+                <a14:hiddenLine xmlns:a14="http://schemas.microsoft.com/office/drawing/2010/main" xmlns="" w="9525">
                   <a:solidFill>
                     <a:srgbClr val="000000"/>
                   </a:solidFill>
@@ -3448,7 +3448,7 @@
             </a:ln>
             <a:extLst>
               <a:ext uri="{91240B29-F687-4f45-9708-019B960494DF}">
-                <a14:hiddenLine xmlns="" xmlns:a14="http://schemas.microsoft.com/office/drawing/2010/main" w="9525">
+                <a14:hiddenLine xmlns:a14="http://schemas.microsoft.com/office/drawing/2010/main" xmlns="" w="9525">
                   <a:solidFill>
                     <a:srgbClr val="000000"/>
                   </a:solidFill>
@@ -3538,7 +3538,7 @@
             </a:ln>
             <a:extLst>
               <a:ext uri="{91240B29-F687-4f45-9708-019B960494DF}">
-                <a14:hiddenLine xmlns="" xmlns:a14="http://schemas.microsoft.com/office/drawing/2010/main" w="9525">
+                <a14:hiddenLine xmlns:a14="http://schemas.microsoft.com/office/drawing/2010/main" xmlns="" w="9525">
                   <a:solidFill>
                     <a:srgbClr val="000000"/>
                   </a:solidFill>
@@ -3628,7 +3628,7 @@
             </a:ln>
             <a:extLst>
               <a:ext uri="{91240B29-F687-4f45-9708-019B960494DF}">
-                <a14:hiddenLine xmlns="" xmlns:a14="http://schemas.microsoft.com/office/drawing/2010/main" w="9525">
+                <a14:hiddenLine xmlns:a14="http://schemas.microsoft.com/office/drawing/2010/main" xmlns="" w="9525">
                   <a:solidFill>
                     <a:srgbClr val="000000"/>
                   </a:solidFill>
@@ -3693,7 +3693,7 @@
             </a:ln>
             <a:extLst>
               <a:ext uri="{91240B29-F687-4f45-9708-019B960494DF}">
-                <a14:hiddenLine xmlns="" xmlns:a14="http://schemas.microsoft.com/office/drawing/2010/main" w="9525">
+                <a14:hiddenLine xmlns:a14="http://schemas.microsoft.com/office/drawing/2010/main" xmlns="" w="9525">
                   <a:solidFill>
                     <a:srgbClr val="000000"/>
                   </a:solidFill>
@@ -3755,7 +3755,7 @@
             </a:ln>
             <a:extLst>
               <a:ext uri="{91240B29-F687-4f45-9708-019B960494DF}">
-                <a14:hiddenLine xmlns="" xmlns:a14="http://schemas.microsoft.com/office/drawing/2010/main" w="9525">
+                <a14:hiddenLine xmlns:a14="http://schemas.microsoft.com/office/drawing/2010/main" xmlns="" w="9525">
                   <a:solidFill>
                     <a:srgbClr val="000000"/>
                   </a:solidFill>
@@ -3845,7 +3845,7 @@
             </a:ln>
             <a:extLst>
               <a:ext uri="{91240B29-F687-4f45-9708-019B960494DF}">
-                <a14:hiddenLine xmlns="" xmlns:a14="http://schemas.microsoft.com/office/drawing/2010/main" w="9525">
+                <a14:hiddenLine xmlns:a14="http://schemas.microsoft.com/office/drawing/2010/main" xmlns="" w="9525">
                   <a:solidFill>
                     <a:srgbClr val="000000"/>
                   </a:solidFill>
@@ -3935,7 +3935,7 @@
             </a:ln>
             <a:extLst>
               <a:ext uri="{91240B29-F687-4f45-9708-019B960494DF}">
-                <a14:hiddenLine xmlns="" xmlns:a14="http://schemas.microsoft.com/office/drawing/2010/main" w="9525">
+                <a14:hiddenLine xmlns:a14="http://schemas.microsoft.com/office/drawing/2010/main" xmlns="" w="9525">
                   <a:solidFill>
                     <a:srgbClr val="000000"/>
                   </a:solidFill>
@@ -3997,7 +3997,7 @@
             </a:ln>
             <a:extLst>
               <a:ext uri="{91240B29-F687-4f45-9708-019B960494DF}">
-                <a14:hiddenLine xmlns="" xmlns:a14="http://schemas.microsoft.com/office/drawing/2010/main" w="9525">
+                <a14:hiddenLine xmlns:a14="http://schemas.microsoft.com/office/drawing/2010/main" xmlns="" w="9525">
                   <a:solidFill>
                     <a:srgbClr val="000000"/>
                   </a:solidFill>
@@ -4117,7 +4117,7 @@
             </a:ln>
             <a:extLst>
               <a:ext uri="{91240B29-F687-4f45-9708-019B960494DF}">
-                <a14:hiddenLine xmlns="" xmlns:a14="http://schemas.microsoft.com/office/drawing/2010/main" w="9525">
+                <a14:hiddenLine xmlns:a14="http://schemas.microsoft.com/office/drawing/2010/main" xmlns="" w="9525">
                   <a:solidFill>
                     <a:srgbClr val="000000"/>
                   </a:solidFill>
@@ -4185,7 +4185,7 @@
             </a:ln>
             <a:extLst>
               <a:ext uri="{91240B29-F687-4f45-9708-019B960494DF}">
-                <a14:hiddenLine xmlns="" xmlns:a14="http://schemas.microsoft.com/office/drawing/2010/main" w="9525">
+                <a14:hiddenLine xmlns:a14="http://schemas.microsoft.com/office/drawing/2010/main" xmlns="" w="9525">
                   <a:solidFill>
                     <a:srgbClr val="000000"/>
                   </a:solidFill>
@@ -4275,7 +4275,7 @@
             </a:ln>
             <a:extLst>
               <a:ext uri="{91240B29-F687-4f45-9708-019B960494DF}">
-                <a14:hiddenLine xmlns="" xmlns:a14="http://schemas.microsoft.com/office/drawing/2010/main" w="9525">
+                <a14:hiddenLine xmlns:a14="http://schemas.microsoft.com/office/drawing/2010/main" xmlns="" w="9525">
                   <a:solidFill>
                     <a:srgbClr val="000000"/>
                   </a:solidFill>
@@ -9004,7 +9004,7 @@
           <a:noFill/>
           <a:extLst>
             <a:ext uri="{909E8E84-426E-40dd-AFC4-6F175D3DCCD1}">
-              <a14:hiddenFill xmlns="" xmlns:a14="http://schemas.microsoft.com/office/drawing/2010/main">
+              <a14:hiddenFill xmlns:a14="http://schemas.microsoft.com/office/drawing/2010/main" xmlns="">
                 <a:solidFill>
                   <a:srgbClr val="FFFFFF"/>
                 </a:solidFill>
@@ -9078,7 +9078,7 @@
               </a:ln>
               <a:extLst>
                 <a:ext uri="{91240B29-F687-4f45-9708-019B960494DF}">
-                  <a14:hiddenLine xmlns="" xmlns:a14="http://schemas.microsoft.com/office/drawing/2010/main" w="9525">
+                  <a14:hiddenLine xmlns:a14="http://schemas.microsoft.com/office/drawing/2010/main" xmlns="" w="9525">
                     <a:solidFill>
                       <a:srgbClr val="000000"/>
                     </a:solidFill>
@@ -9168,7 +9168,7 @@
               </a:ln>
               <a:extLst>
                 <a:ext uri="{91240B29-F687-4f45-9708-019B960494DF}">
-                  <a14:hiddenLine xmlns="" xmlns:a14="http://schemas.microsoft.com/office/drawing/2010/main" w="9525">
+                  <a14:hiddenLine xmlns:a14="http://schemas.microsoft.com/office/drawing/2010/main" xmlns="" w="9525">
                     <a:solidFill>
                       <a:srgbClr val="000000"/>
                     </a:solidFill>
@@ -9258,7 +9258,7 @@
               </a:ln>
               <a:extLst>
                 <a:ext uri="{91240B29-F687-4f45-9708-019B960494DF}">
-                  <a14:hiddenLine xmlns="" xmlns:a14="http://schemas.microsoft.com/office/drawing/2010/main" w="9525">
+                  <a14:hiddenLine xmlns:a14="http://schemas.microsoft.com/office/drawing/2010/main" xmlns="" w="9525">
                     <a:solidFill>
                       <a:srgbClr val="000000"/>
                     </a:solidFill>
@@ -9320,7 +9320,7 @@
               </a:ln>
               <a:extLst>
                 <a:ext uri="{91240B29-F687-4f45-9708-019B960494DF}">
-                  <a14:hiddenLine xmlns="" xmlns:a14="http://schemas.microsoft.com/office/drawing/2010/main" w="9525">
+                  <a14:hiddenLine xmlns:a14="http://schemas.microsoft.com/office/drawing/2010/main" xmlns="" w="9525">
                     <a:solidFill>
                       <a:srgbClr val="000000"/>
                     </a:solidFill>
@@ -9410,7 +9410,7 @@
               </a:ln>
               <a:extLst>
                 <a:ext uri="{91240B29-F687-4f45-9708-019B960494DF}">
-                  <a14:hiddenLine xmlns="" xmlns:a14="http://schemas.microsoft.com/office/drawing/2010/main" w="9525">
+                  <a14:hiddenLine xmlns:a14="http://schemas.microsoft.com/office/drawing/2010/main" xmlns="" w="9525">
                     <a:solidFill>
                       <a:srgbClr val="000000"/>
                     </a:solidFill>
@@ -9472,7 +9472,7 @@
               </a:ln>
               <a:extLst>
                 <a:ext uri="{91240B29-F687-4f45-9708-019B960494DF}">
-                  <a14:hiddenLine xmlns="" xmlns:a14="http://schemas.microsoft.com/office/drawing/2010/main" w="9525">
+                  <a14:hiddenLine xmlns:a14="http://schemas.microsoft.com/office/drawing/2010/main" xmlns="" w="9525">
                     <a:solidFill>
                       <a:srgbClr val="000000"/>
                     </a:solidFill>
@@ -9534,7 +9534,7 @@
               </a:ln>
               <a:extLst>
                 <a:ext uri="{91240B29-F687-4f45-9708-019B960494DF}">
-                  <a14:hiddenLine xmlns="" xmlns:a14="http://schemas.microsoft.com/office/drawing/2010/main" w="9525">
+                  <a14:hiddenLine xmlns:a14="http://schemas.microsoft.com/office/drawing/2010/main" xmlns="" w="9525">
                     <a:solidFill>
                       <a:srgbClr val="000000"/>
                     </a:solidFill>
@@ -9624,7 +9624,7 @@
               </a:ln>
               <a:extLst>
                 <a:ext uri="{91240B29-F687-4f45-9708-019B960494DF}">
-                  <a14:hiddenLine xmlns="" xmlns:a14="http://schemas.microsoft.com/office/drawing/2010/main" w="9525">
+                  <a14:hiddenLine xmlns:a14="http://schemas.microsoft.com/office/drawing/2010/main" xmlns="" w="9525">
                     <a:solidFill>
                       <a:srgbClr val="000000"/>
                     </a:solidFill>
@@ -9714,7 +9714,7 @@
               </a:ln>
               <a:extLst>
                 <a:ext uri="{91240B29-F687-4f45-9708-019B960494DF}">
-                  <a14:hiddenLine xmlns="" xmlns:a14="http://schemas.microsoft.com/office/drawing/2010/main" w="9525">
+                  <a14:hiddenLine xmlns:a14="http://schemas.microsoft.com/office/drawing/2010/main" xmlns="" w="9525">
                     <a:solidFill>
                       <a:srgbClr val="000000"/>
                     </a:solidFill>
@@ -9776,7 +9776,7 @@
               </a:ln>
               <a:extLst>
                 <a:ext uri="{91240B29-F687-4f45-9708-019B960494DF}">
-                  <a14:hiddenLine xmlns="" xmlns:a14="http://schemas.microsoft.com/office/drawing/2010/main" w="9525">
+                  <a14:hiddenLine xmlns:a14="http://schemas.microsoft.com/office/drawing/2010/main" xmlns="" w="9525">
                     <a:solidFill>
                       <a:srgbClr val="000000"/>
                     </a:solidFill>
@@ -9886,7 +9886,7 @@
               </a:ln>
               <a:extLst>
                 <a:ext uri="{91240B29-F687-4f45-9708-019B960494DF}">
-                  <a14:hiddenLine xmlns="" xmlns:a14="http://schemas.microsoft.com/office/drawing/2010/main" w="9525">
+                  <a14:hiddenLine xmlns:a14="http://schemas.microsoft.com/office/drawing/2010/main" xmlns="" w="9525">
                     <a:solidFill>
                       <a:srgbClr val="000000"/>
                     </a:solidFill>
@@ -9970,7 +9970,7 @@
               </a:ln>
               <a:extLst>
                 <a:ext uri="{91240B29-F687-4f45-9708-019B960494DF}">
-                  <a14:hiddenLine xmlns="" xmlns:a14="http://schemas.microsoft.com/office/drawing/2010/main" w="9525">
+                  <a14:hiddenLine xmlns:a14="http://schemas.microsoft.com/office/drawing/2010/main" xmlns="" w="9525">
                     <a:solidFill>
                       <a:srgbClr val="000000"/>
                     </a:solidFill>
@@ -10032,7 +10032,7 @@
               </a:ln>
               <a:extLst>
                 <a:ext uri="{91240B29-F687-4f45-9708-019B960494DF}">
-                  <a14:hiddenLine xmlns="" xmlns:a14="http://schemas.microsoft.com/office/drawing/2010/main" w="9525">
+                  <a14:hiddenLine xmlns:a14="http://schemas.microsoft.com/office/drawing/2010/main" xmlns="" w="9525">
                     <a:solidFill>
                       <a:srgbClr val="000000"/>
                     </a:solidFill>
@@ -10094,7 +10094,7 @@
               </a:ln>
               <a:extLst>
                 <a:ext uri="{91240B29-F687-4f45-9708-019B960494DF}">
-                  <a14:hiddenLine xmlns="" xmlns:a14="http://schemas.microsoft.com/office/drawing/2010/main" w="9525">
+                  <a14:hiddenLine xmlns:a14="http://schemas.microsoft.com/office/drawing/2010/main" xmlns="" w="9525">
                     <a:solidFill>
                       <a:srgbClr val="000000"/>
                     </a:solidFill>
@@ -10184,7 +10184,7 @@
               </a:ln>
               <a:extLst>
                 <a:ext uri="{91240B29-F687-4f45-9708-019B960494DF}">
-                  <a14:hiddenLine xmlns="" xmlns:a14="http://schemas.microsoft.com/office/drawing/2010/main" w="9525">
+                  <a14:hiddenLine xmlns:a14="http://schemas.microsoft.com/office/drawing/2010/main" xmlns="" w="9525">
                     <a:solidFill>
                       <a:srgbClr val="000000"/>
                     </a:solidFill>
@@ -10218,7 +10218,7 @@
               </a:ln>
               <a:extLst>
                 <a:ext uri="{91240B29-F687-4f45-9708-019B960494DF}">
-                  <a14:hiddenLine xmlns="" xmlns:a14="http://schemas.microsoft.com/office/drawing/2010/main" w="9525">
+                  <a14:hiddenLine xmlns:a14="http://schemas.microsoft.com/office/drawing/2010/main" xmlns="" w="9525">
                     <a:solidFill>
                       <a:srgbClr val="000000"/>
                     </a:solidFill>
@@ -10283,7 +10283,7 @@
               </a:ln>
               <a:extLst>
                 <a:ext uri="{91240B29-F687-4f45-9708-019B960494DF}">
-                  <a14:hiddenLine xmlns="" xmlns:a14="http://schemas.microsoft.com/office/drawing/2010/main" w="9525">
+                  <a14:hiddenLine xmlns:a14="http://schemas.microsoft.com/office/drawing/2010/main" xmlns="" w="9525">
                     <a:solidFill>
                       <a:srgbClr val="000000"/>
                     </a:solidFill>
@@ -10373,7 +10373,7 @@
               </a:ln>
               <a:extLst>
                 <a:ext uri="{91240B29-F687-4f45-9708-019B960494DF}">
-                  <a14:hiddenLine xmlns="" xmlns:a14="http://schemas.microsoft.com/office/drawing/2010/main" w="9525">
+                  <a14:hiddenLine xmlns:a14="http://schemas.microsoft.com/office/drawing/2010/main" xmlns="" w="9525">
                     <a:solidFill>
                       <a:srgbClr val="000000"/>
                     </a:solidFill>
@@ -10435,7 +10435,7 @@
               </a:ln>
               <a:extLst>
                 <a:ext uri="{91240B29-F687-4f45-9708-019B960494DF}">
-                  <a14:hiddenLine xmlns="" xmlns:a14="http://schemas.microsoft.com/office/drawing/2010/main" w="9525">
+                  <a14:hiddenLine xmlns:a14="http://schemas.microsoft.com/office/drawing/2010/main" xmlns="" w="9525">
                     <a:solidFill>
                       <a:srgbClr val="000000"/>
                     </a:solidFill>
@@ -10525,7 +10525,7 @@
               </a:ln>
               <a:extLst>
                 <a:ext uri="{91240B29-F687-4f45-9708-019B960494DF}">
-                  <a14:hiddenLine xmlns="" xmlns:a14="http://schemas.microsoft.com/office/drawing/2010/main" w="9525">
+                  <a14:hiddenLine xmlns:a14="http://schemas.microsoft.com/office/drawing/2010/main" xmlns="" w="9525">
                     <a:solidFill>
                       <a:srgbClr val="000000"/>
                     </a:solidFill>
@@ -10590,7 +10590,7 @@
               </a:ln>
               <a:extLst>
                 <a:ext uri="{91240B29-F687-4f45-9708-019B960494DF}">
-                  <a14:hiddenLine xmlns="" xmlns:a14="http://schemas.microsoft.com/office/drawing/2010/main" w="9525">
+                  <a14:hiddenLine xmlns:a14="http://schemas.microsoft.com/office/drawing/2010/main" xmlns="" w="9525">
                     <a:solidFill>
                       <a:srgbClr val="000000"/>
                     </a:solidFill>
@@ -10652,7 +10652,7 @@
               </a:ln>
               <a:extLst>
                 <a:ext uri="{91240B29-F687-4f45-9708-019B960494DF}">
-                  <a14:hiddenLine xmlns="" xmlns:a14="http://schemas.microsoft.com/office/drawing/2010/main" w="9525">
+                  <a14:hiddenLine xmlns:a14="http://schemas.microsoft.com/office/drawing/2010/main" xmlns="" w="9525">
                     <a:solidFill>
                       <a:srgbClr val="000000"/>
                     </a:solidFill>
@@ -10742,7 +10742,7 @@
               </a:ln>
               <a:extLst>
                 <a:ext uri="{91240B29-F687-4f45-9708-019B960494DF}">
-                  <a14:hiddenLine xmlns="" xmlns:a14="http://schemas.microsoft.com/office/drawing/2010/main" w="9525">
+                  <a14:hiddenLine xmlns:a14="http://schemas.microsoft.com/office/drawing/2010/main" xmlns="" w="9525">
                     <a:solidFill>
                       <a:srgbClr val="000000"/>
                     </a:solidFill>
@@ -10832,7 +10832,7 @@
               </a:ln>
               <a:extLst>
                 <a:ext uri="{91240B29-F687-4f45-9708-019B960494DF}">
-                  <a14:hiddenLine xmlns="" xmlns:a14="http://schemas.microsoft.com/office/drawing/2010/main" w="9525">
+                  <a14:hiddenLine xmlns:a14="http://schemas.microsoft.com/office/drawing/2010/main" xmlns="" w="9525">
                     <a:solidFill>
                       <a:srgbClr val="000000"/>
                     </a:solidFill>
@@ -10897,7 +10897,7 @@
               </a:ln>
               <a:extLst>
                 <a:ext uri="{91240B29-F687-4f45-9708-019B960494DF}">
-                  <a14:hiddenLine xmlns="" xmlns:a14="http://schemas.microsoft.com/office/drawing/2010/main" w="9525">
+                  <a14:hiddenLine xmlns:a14="http://schemas.microsoft.com/office/drawing/2010/main" xmlns="" w="9525">
                     <a:solidFill>
                       <a:srgbClr val="000000"/>
                     </a:solidFill>
@@ -11017,7 +11017,7 @@
               </a:ln>
               <a:extLst>
                 <a:ext uri="{91240B29-F687-4f45-9708-019B960494DF}">
-                  <a14:hiddenLine xmlns="" xmlns:a14="http://schemas.microsoft.com/office/drawing/2010/main" w="9525">
+                  <a14:hiddenLine xmlns:a14="http://schemas.microsoft.com/office/drawing/2010/main" xmlns="" w="9525">
                     <a:solidFill>
                       <a:srgbClr val="000000"/>
                     </a:solidFill>
@@ -11098,7 +11098,7 @@
               </a:ln>
               <a:extLst>
                 <a:ext uri="{91240B29-F687-4f45-9708-019B960494DF}">
-                  <a14:hiddenLine xmlns="" xmlns:a14="http://schemas.microsoft.com/office/drawing/2010/main" w="9525">
+                  <a14:hiddenLine xmlns:a14="http://schemas.microsoft.com/office/drawing/2010/main" xmlns="" w="9525">
                     <a:solidFill>
                       <a:srgbClr val="000000"/>
                     </a:solidFill>
@@ -11213,7 +11213,7 @@
               </a:ln>
               <a:extLst>
                 <a:ext uri="{91240B29-F687-4f45-9708-019B960494DF}">
-                  <a14:hiddenLine xmlns="" xmlns:a14="http://schemas.microsoft.com/office/drawing/2010/main" w="9525">
+                  <a14:hiddenLine xmlns:a14="http://schemas.microsoft.com/office/drawing/2010/main" xmlns="" w="9525">
                     <a:solidFill>
                       <a:srgbClr val="000000"/>
                     </a:solidFill>
@@ -11303,7 +11303,7 @@
               </a:ln>
               <a:extLst>
                 <a:ext uri="{91240B29-F687-4f45-9708-019B960494DF}">
-                  <a14:hiddenLine xmlns="" xmlns:a14="http://schemas.microsoft.com/office/drawing/2010/main" w="9525">
+                  <a14:hiddenLine xmlns:a14="http://schemas.microsoft.com/office/drawing/2010/main" xmlns="" w="9525">
                     <a:solidFill>
                       <a:srgbClr val="000000"/>
                     </a:solidFill>
@@ -11368,7 +11368,7 @@
               </a:ln>
               <a:extLst>
                 <a:ext uri="{91240B29-F687-4f45-9708-019B960494DF}">
-                  <a14:hiddenLine xmlns="" xmlns:a14="http://schemas.microsoft.com/office/drawing/2010/main" w="9525">
+                  <a14:hiddenLine xmlns:a14="http://schemas.microsoft.com/office/drawing/2010/main" xmlns="" w="9525">
                     <a:solidFill>
                       <a:srgbClr val="000000"/>
                     </a:solidFill>
@@ -11458,7 +11458,7 @@
               </a:ln>
               <a:extLst>
                 <a:ext uri="{91240B29-F687-4f45-9708-019B960494DF}">
-                  <a14:hiddenLine xmlns="" xmlns:a14="http://schemas.microsoft.com/office/drawing/2010/main" w="9525">
+                  <a14:hiddenLine xmlns:a14="http://schemas.microsoft.com/office/drawing/2010/main" xmlns="" w="9525">
                     <a:solidFill>
                       <a:srgbClr val="000000"/>
                     </a:solidFill>
@@ -11526,7 +11526,7 @@
               </a:ln>
               <a:extLst>
                 <a:ext uri="{91240B29-F687-4f45-9708-019B960494DF}">
-                  <a14:hiddenLine xmlns="" xmlns:a14="http://schemas.microsoft.com/office/drawing/2010/main" w="9525">
+                  <a14:hiddenLine xmlns:a14="http://schemas.microsoft.com/office/drawing/2010/main" xmlns="" w="9525">
                     <a:solidFill>
                       <a:srgbClr val="000000"/>
                     </a:solidFill>
@@ -11616,7 +11616,7 @@
               </a:ln>
               <a:extLst>
                 <a:ext uri="{91240B29-F687-4f45-9708-019B960494DF}">
-                  <a14:hiddenLine xmlns="" xmlns:a14="http://schemas.microsoft.com/office/drawing/2010/main" w="9525">
+                  <a14:hiddenLine xmlns:a14="http://schemas.microsoft.com/office/drawing/2010/main" xmlns="" w="9525">
                     <a:solidFill>
                       <a:srgbClr val="000000"/>
                     </a:solidFill>
@@ -11684,7 +11684,7 @@
               </a:ln>
               <a:extLst>
                 <a:ext uri="{91240B29-F687-4f45-9708-019B960494DF}">
-                  <a14:hiddenLine xmlns="" xmlns:a14="http://schemas.microsoft.com/office/drawing/2010/main" w="9525">
+                  <a14:hiddenLine xmlns:a14="http://schemas.microsoft.com/office/drawing/2010/main" xmlns="" w="9525">
                     <a:solidFill>
                       <a:srgbClr val="000000"/>
                     </a:solidFill>
@@ -11774,7 +11774,7 @@
               </a:ln>
               <a:extLst>
                 <a:ext uri="{91240B29-F687-4f45-9708-019B960494DF}">
-                  <a14:hiddenLine xmlns="" xmlns:a14="http://schemas.microsoft.com/office/drawing/2010/main" w="9525">
+                  <a14:hiddenLine xmlns:a14="http://schemas.microsoft.com/office/drawing/2010/main" xmlns="" w="9525">
                     <a:solidFill>
                       <a:srgbClr val="000000"/>
                     </a:solidFill>
@@ -11808,7 +11808,7 @@
               </a:ln>
               <a:extLst>
                 <a:ext uri="{91240B29-F687-4f45-9708-019B960494DF}">
-                  <a14:hiddenLine xmlns="" xmlns:a14="http://schemas.microsoft.com/office/drawing/2010/main" w="9525">
+                  <a14:hiddenLine xmlns:a14="http://schemas.microsoft.com/office/drawing/2010/main" xmlns="" w="9525">
                     <a:solidFill>
                       <a:srgbClr val="000000"/>
                     </a:solidFill>
@@ -12993,8 +12993,8 @@
         </p:nvSpPr>
         <p:spPr>
           <a:xfrm>
-            <a:off x="825622" y="756918"/>
-            <a:ext cx="10537793" cy="1015663"/>
+            <a:off x="827103" y="600985"/>
+            <a:ext cx="10537793" cy="707886"/>
           </a:xfrm>
           <a:prstGeom prst="rect">
             <a:avLst/>
@@ -13013,7 +13013,7 @@
             </a:pPr>
             <a:r>
               <a:rPr lang="en-US" sz="2000" dirty="0"/>
-              <a:t>Check the parameters for null or whitespace. If Yes, then throw the Exception Error msg.</a:t>
+              <a:t>Check the parameters for null or whitespace. If Yes, then throws an Exception Error msg.</a:t>
             </a:r>
           </a:p>
           <a:p>
@@ -13023,17 +13023,7 @@
             </a:pPr>
             <a:r>
               <a:rPr lang="en-US" sz="2000" dirty="0"/>
-              <a:t>Otherwise, Check the parameters in Database</a:t>
-            </a:r>
-          </a:p>
-          <a:p>
-            <a:pPr marL="285750" indent="-285750">
-              <a:buFont typeface="Arial" panose="020B0604020202020204" pitchFamily="34" charset="0"/>
-              <a:buChar char="•"/>
-            </a:pPr>
-            <a:r>
-              <a:rPr lang="en-US" sz="2000" dirty="0"/>
-              <a:t>Save the ClientID in a variable in order to access data for same Client in the Landing Page</a:t>
+              <a:t>Second Step : Verify Password Hash in Database</a:t>
             </a:r>
           </a:p>
         </p:txBody>
@@ -13103,10 +13093,10 @@
       </p:sp>
       <p:pic>
         <p:nvPicPr>
-          <p:cNvPr id="13" name="Picture 12">
+          <p:cNvPr id="2" name="Picture 1">
             <a:extLst>
               <a:ext uri="{FF2B5EF4-FFF2-40B4-BE49-F238E27FC236}">
-                <a16:creationId xmlns:a16="http://schemas.microsoft.com/office/drawing/2014/main" id="{B65869E2-DE4B-4271-A89D-4258DE2BA822}"/>
+                <a16:creationId xmlns:a16="http://schemas.microsoft.com/office/drawing/2014/main" id="{034C8FDB-D989-4A22-94F8-A536175D4860}"/>
               </a:ext>
             </a:extLst>
           </p:cNvPr>
@@ -13123,8 +13113,8 @@
         </p:blipFill>
         <p:spPr>
           <a:xfrm>
-            <a:off x="825621" y="1824362"/>
-            <a:ext cx="10537793" cy="4877996"/>
+            <a:off x="827103" y="1308871"/>
+            <a:ext cx="10135478" cy="5423017"/>
           </a:xfrm>
           <a:prstGeom prst="rect">
             <a:avLst/>
@@ -13671,7 +13661,7 @@
         <p:spPr>
           <a:xfrm>
             <a:off x="606733" y="4433141"/>
-            <a:ext cx="3621479" cy="2523768"/>
+            <a:ext cx="3621479" cy="2215991"/>
           </a:xfrm>
           <a:prstGeom prst="rect">
             <a:avLst/>
@@ -13689,8 +13679,12 @@
               <a:buChar char="•"/>
             </a:pPr>
             <a:r>
+              <a:rPr lang="en-US" sz="2000" dirty="0" err="1"/>
+              <a:t>array.map</a:t>
+            </a:r>
+            <a:r>
               <a:rPr lang="en-US" sz="2000" dirty="0"/>
-              <a:t>Array Map() method in JSX to populate client’s Data</a:t>
+              <a:t>() method in JSX to populate client’s Data</a:t>
             </a:r>
           </a:p>
           <a:p>
@@ -13699,8 +13693,12 @@
               <a:buChar char="•"/>
             </a:pPr>
             <a:r>
+              <a:rPr lang="en-US" sz="2000" dirty="0" err="1"/>
+              <a:t>array.reduce</a:t>
+            </a:r>
+            <a:r>
               <a:rPr lang="en-US" sz="2000" dirty="0"/>
-              <a:t>Array Reduce() method for total Holdings calculation</a:t>
+              <a:t>() method for total Holdings calculation</a:t>
             </a:r>
           </a:p>
           <a:p>
@@ -13970,7 +13968,7 @@
             </a:pPr>
             <a:r>
               <a:rPr lang="en-US" sz="2000" dirty="0"/>
-              <a:t>Pass filtered Array to next page which is View Expenses Page</a:t>
+              <a:t>Pass filtered Array to next page through Link( Expenses Page )</a:t>
             </a:r>
           </a:p>
         </p:txBody>
@@ -14823,7 +14821,7 @@
             </a:pPr>
             <a:r>
               <a:rPr lang="en-US" sz="2000" dirty="0"/>
-              <a:t>Let’s check this out in VS</a:t>
+              <a:t>Let’s check String Validation in more detail.</a:t>
             </a:r>
           </a:p>
         </p:txBody>
@@ -15903,7 +15901,7 @@
         <p:spPr>
           <a:xfrm>
             <a:off x="1353685" y="1572774"/>
-            <a:ext cx="6896910" cy="1323439"/>
+            <a:ext cx="6896910" cy="1938992"/>
           </a:xfrm>
           <a:prstGeom prst="rect">
             <a:avLst/>
@@ -15953,6 +15951,16 @@
             <a:r>
               <a:rPr lang="en-US" sz="2000" dirty="0"/>
               <a:t>Final, if successful, then create Transaction</a:t>
+            </a:r>
+          </a:p>
+          <a:p>
+            <a:pPr marL="342900" indent="-342900">
+              <a:buFont typeface="Arial" panose="020B0604020202020204" pitchFamily="34" charset="0"/>
+              <a:buChar char="•"/>
+            </a:pPr>
+            <a:r>
+              <a:rPr lang="en-US" sz="2000" dirty="0"/>
+              <a:t>Extra Features : Cashback total reaches $100 then auto adds to main balance</a:t>
             </a:r>
           </a:p>
         </p:txBody>

</xml_diff>

<commit_message>
Updated Virtual Velocity ppt
</commit_message>
<xml_diff>
--- a/Planning/Virtual Velocity V1.2.pptx
+++ b/Planning/Virtual Velocity V1.2.pptx
@@ -22738,10 +22738,10 @@
       </p:pic>
       <p:pic>
         <p:nvPicPr>
-          <p:cNvPr id="6" name="Picture 5">
+          <p:cNvPr id="7" name="Picture 6">
             <a:extLst>
               <a:ext uri="{FF2B5EF4-FFF2-40B4-BE49-F238E27FC236}">
-                <a16:creationId xmlns:a16="http://schemas.microsoft.com/office/drawing/2014/main" id="{438B31AD-A1AE-4029-943A-9EE2B08C883F}"/>
+                <a16:creationId xmlns:a16="http://schemas.microsoft.com/office/drawing/2014/main" id="{0F07442C-FBA9-45DD-85E1-535A1AE1683B}"/>
               </a:ext>
             </a:extLst>
           </p:cNvPr>
@@ -22758,8 +22758,8 @@
         </p:blipFill>
         <p:spPr>
           <a:xfrm>
-            <a:off x="7968166" y="2183610"/>
-            <a:ext cx="3109229" cy="4206605"/>
+            <a:off x="4599824" y="926202"/>
+            <a:ext cx="2400508" cy="4900085"/>
           </a:xfrm>
           <a:prstGeom prst="rect">
             <a:avLst/>
@@ -22768,10 +22768,10 @@
       </p:pic>
       <p:pic>
         <p:nvPicPr>
-          <p:cNvPr id="7" name="Picture 6">
+          <p:cNvPr id="8" name="Picture 7">
             <a:extLst>
               <a:ext uri="{FF2B5EF4-FFF2-40B4-BE49-F238E27FC236}">
-                <a16:creationId xmlns:a16="http://schemas.microsoft.com/office/drawing/2014/main" id="{0F07442C-FBA9-45DD-85E1-535A1AE1683B}"/>
+                <a16:creationId xmlns:a16="http://schemas.microsoft.com/office/drawing/2014/main" id="{9469550E-8F56-4B27-AF31-8A8A3FA3E0CB}"/>
               </a:ext>
             </a:extLst>
           </p:cNvPr>
@@ -22788,8 +22788,8 @@
         </p:blipFill>
         <p:spPr>
           <a:xfrm>
-            <a:off x="4599824" y="1490130"/>
-            <a:ext cx="2400508" cy="4900085"/>
+            <a:off x="8084793" y="926202"/>
+            <a:ext cx="3177815" cy="3932261"/>
           </a:xfrm>
           <a:prstGeom prst="rect">
             <a:avLst/>

</xml_diff>